<commit_message>
Week 2 last slides and examples
</commit_message>
<xml_diff>
--- a/Slides/Lesson 2.1 Documenting Your Design.pptx
+++ b/Slides/Lesson 2.1 Documenting Your Design.pptx
@@ -253,7 +253,7 @@
           <a:p>
             <a:fld id="{7C7E5181-6CF5-45F7-A87A-E0E0B1FD7549}" type="datetimeFigureOut">
               <a:rPr lang="en-US" smtClean="0"/>
-              <a:t>1/21/2021</a:t>
+              <a:t>1/24/2021</a:t>
             </a:fld>
             <a:endParaRPr lang="en-US"/>
           </a:p>
@@ -674,7 +674,7 @@
           <a:p>
             <a:fld id="{5D2A64DE-480B-420F-9649-4F8E696E08E0}" type="datetime1">
               <a:rPr lang="en-US" smtClean="0"/>
-              <a:t>1/21/2021</a:t>
+              <a:t>1/24/2021</a:t>
             </a:fld>
             <a:endParaRPr lang="en-US"/>
           </a:p>
@@ -908,7 +908,7 @@
           <a:p>
             <a:fld id="{0D3616D0-8311-4107-9726-6B805E7D05BA}" type="datetime1">
               <a:rPr lang="en-US" smtClean="0"/>
-              <a:t>1/21/2021</a:t>
+              <a:t>1/24/2021</a:t>
             </a:fld>
             <a:endParaRPr lang="en-US"/>
           </a:p>
@@ -1116,7 +1116,7 @@
           <a:p>
             <a:fld id="{3BC2557A-5C88-417A-A763-5AC779462A5F}" type="datetime1">
               <a:rPr lang="en-US" smtClean="0"/>
-              <a:t>1/21/2021</a:t>
+              <a:t>1/24/2021</a:t>
             </a:fld>
             <a:endParaRPr lang="en-US"/>
           </a:p>
@@ -1640,7 +1640,7 @@
           <a:p>
             <a:fld id="{07C7BFD4-467E-4EDE-93EA-052F5B39A4E5}" type="datetime1">
               <a:rPr lang="en-US" smtClean="0"/>
-              <a:t>1/21/2021</a:t>
+              <a:t>1/24/2021</a:t>
             </a:fld>
             <a:endParaRPr lang="en-US"/>
           </a:p>
@@ -1953,7 +1953,7 @@
           <a:p>
             <a:fld id="{A533CBE2-D5BE-47AC-ADC2-9CDFC1D0CF90}" type="datetime1">
               <a:rPr lang="en-US" smtClean="0"/>
-              <a:t>1/21/2021</a:t>
+              <a:t>1/24/2021</a:t>
             </a:fld>
             <a:endParaRPr lang="en-US"/>
           </a:p>
@@ -2254,7 +2254,7 @@
           <a:p>
             <a:fld id="{39B7EDB1-CE74-4951-85A2-0B01C2128E28}" type="datetime1">
               <a:rPr lang="en-US" smtClean="0"/>
-              <a:t>1/21/2021</a:t>
+              <a:t>1/24/2021</a:t>
             </a:fld>
             <a:endParaRPr lang="en-US"/>
           </a:p>
@@ -2702,7 +2702,7 @@
           <a:p>
             <a:fld id="{2BC7EB92-A5C2-4807-A9DC-9EDE6CBFB241}" type="datetime1">
               <a:rPr lang="en-US" smtClean="0"/>
-              <a:t>1/21/2021</a:t>
+              <a:t>1/24/2021</a:t>
             </a:fld>
             <a:endParaRPr lang="en-US"/>
           </a:p>
@@ -2848,7 +2848,7 @@
           <a:p>
             <a:fld id="{109E55A0-C911-4F03-82FC-7E5926047D46}" type="datetime1">
               <a:rPr lang="en-US" smtClean="0"/>
-              <a:t>1/21/2021</a:t>
+              <a:t>1/24/2021</a:t>
             </a:fld>
             <a:endParaRPr lang="en-US"/>
           </a:p>
@@ -2997,7 +2997,7 @@
           <a:p>
             <a:fld id="{2B7B7EE0-7771-4CD5-9B2B-3550753A54A1}" type="datetime1">
               <a:rPr lang="en-US" smtClean="0"/>
-              <a:t>1/21/2021</a:t>
+              <a:t>1/24/2021</a:t>
             </a:fld>
             <a:endParaRPr lang="en-US"/>
           </a:p>
@@ -3308,7 +3308,7 @@
           <a:p>
             <a:fld id="{F8B318B3-0E87-4416-A9B8-D891968C2727}" type="datetime1">
               <a:rPr lang="en-US" smtClean="0"/>
-              <a:t>1/21/2021</a:t>
+              <a:t>1/24/2021</a:t>
             </a:fld>
             <a:endParaRPr lang="en-US"/>
           </a:p>
@@ -3596,7 +3596,7 @@
           <a:p>
             <a:fld id="{EA476A42-A091-4468-A075-64A31BE59948}" type="datetime1">
               <a:rPr lang="en-US" smtClean="0"/>
-              <a:t>1/21/2021</a:t>
+              <a:t>1/24/2021</a:t>
             </a:fld>
             <a:endParaRPr lang="en-US"/>
           </a:p>
@@ -3837,7 +3837,7 @@
           <a:p>
             <a:fld id="{54D997E8-DDEE-43F1-8D9B-F8A1E11DE488}" type="datetime1">
               <a:rPr lang="en-US" smtClean="0"/>
-              <a:t>1/21/2021</a:t>
+              <a:t>1/24/2021</a:t>
             </a:fld>
             <a:endParaRPr lang="en-US"/>
           </a:p>
@@ -5397,7 +5397,7 @@
             <p:ph idx="1"/>
             <p:extLst>
               <p:ext uri="{D42A27DB-BD31-4B8C-83A1-F6EECF244321}">
-                <p14:modId xmlns:p14="http://schemas.microsoft.com/office/powerpoint/2010/main" val="1254732576"/>
+                <p14:modId xmlns:p14="http://schemas.microsoft.com/office/powerpoint/2010/main" val="841707785"/>
               </p:ext>
             </p:extLst>
           </p:nvPr>
@@ -5827,7 +5827,7 @@
                           <a:effectLst/>
                           <a:latin typeface="Ink Free" panose="03080402000500000000" pitchFamily="66" charset="0"/>
                         </a:rPr>
-                        <a:t>establish interface for thermometers in the system</a:t>
+                        <a:t>defines interface for thermometers in the system</a:t>
                       </a:r>
                     </a:p>
                   </a:txBody>
@@ -8979,14 +8979,14 @@
           <p:nvPr>
             <p:extLst>
               <p:ext uri="{D42A27DB-BD31-4B8C-83A1-F6EECF244321}">
-                <p14:modId xmlns:p14="http://schemas.microsoft.com/office/powerpoint/2010/main" val="2829603493"/>
+                <p14:modId xmlns:p14="http://schemas.microsoft.com/office/powerpoint/2010/main" val="2231569435"/>
               </p:ext>
             </p:extLst>
           </p:nvPr>
         </p:nvGraphicFramePr>
         <p:xfrm>
           <a:off x="2947249" y="1926737"/>
-          <a:ext cx="5043200" cy="2832905"/>
+          <a:ext cx="5043200" cy="3612271"/>
         </p:xfrm>
         <a:graphic>
           <a:graphicData uri="http://schemas.openxmlformats.org/drawingml/2006/table">
@@ -9200,8 +9200,11 @@
                           <a:effectLst/>
                           <a:latin typeface="Ink Free" panose="03080402000500000000" pitchFamily="66" charset="0"/>
                         </a:rPr>
-                        <a:t>sensors, </a:t>
+                        <a:t>Some sensors, </a:t>
                       </a:r>
+                    </a:p>
+                    <a:p>
+                      <a:pPr algn="l" fontAlgn="t"/>
                       <a:r>
                         <a:rPr lang="en-US" sz="1800" b="1" i="0" u="none" strike="noStrike" dirty="0" err="1">
                           <a:solidFill>
@@ -9240,7 +9243,33 @@
                           <a:effectLst/>
                           <a:latin typeface="Ink Free" panose="03080402000500000000" pitchFamily="66" charset="0"/>
                         </a:rPr>
-                        <a:t>, alarm</a:t>
+                        <a:t>, </a:t>
+                      </a:r>
+                    </a:p>
+                    <a:p>
+                      <a:pPr algn="l" fontAlgn="t"/>
+                      <a:r>
+                        <a:rPr lang="en-US" sz="1800" b="1" i="0" u="none" strike="noStrike" dirty="0">
+                          <a:solidFill>
+                            <a:srgbClr val="000000"/>
+                          </a:solidFill>
+                          <a:effectLst/>
+                          <a:latin typeface="Ink Free" panose="03080402000500000000" pitchFamily="66" charset="0"/>
+                        </a:rPr>
+                        <a:t>The alarm to sound,</a:t>
+                      </a:r>
+                    </a:p>
+                    <a:p>
+                      <a:pPr algn="l" fontAlgn="t"/>
+                      <a:r>
+                        <a:rPr lang="en-US" sz="1800" b="1" i="0" u="none" strike="noStrike" dirty="0">
+                          <a:solidFill>
+                            <a:srgbClr val="000000"/>
+                          </a:solidFill>
+                          <a:effectLst/>
+                          <a:latin typeface="Ink Free" panose="03080402000500000000" pitchFamily="66" charset="0"/>
+                        </a:rPr>
+                        <a:t>Map from sensors to locations</a:t>
                       </a:r>
                     </a:p>
                   </a:txBody>
@@ -10086,7 +10115,7 @@
           <p:nvPr>
             <p:extLst>
               <p:ext uri="{D42A27DB-BD31-4B8C-83A1-F6EECF244321}">
-                <p14:modId xmlns:p14="http://schemas.microsoft.com/office/powerpoint/2010/main" val="776397969"/>
+                <p14:modId xmlns:p14="http://schemas.microsoft.com/office/powerpoint/2010/main" val="1354989040"/>
               </p:ext>
             </p:extLst>
           </p:nvPr>
@@ -10516,7 +10545,7 @@
                           <a:effectLst/>
                           <a:latin typeface="Ink Free" panose="03080402000500000000" pitchFamily="66" charset="0"/>
                         </a:rPr>
-                        <a:t>Interface for classes that will sound an alarm</a:t>
+                        <a:t>Defines interface for classes that will sound an alarm</a:t>
                       </a:r>
                     </a:p>
                   </a:txBody>
@@ -20942,7 +20971,7 @@
             <a:pPr lvl="1"/>
             <a:r>
               <a:rPr lang="en-US" dirty="0"/>
-              <a:t>for us this means the things to which this thing is </a:t>
+              <a:t>for us this means the things with which this thing is </a:t>
             </a:r>
             <a:r>
               <a:rPr lang="en-US" dirty="0">

</xml_diff>